<commit_message>
Fixing slides for Complex Joins and Subqueries
</commit_message>
<xml_diff>
--- a/Courses/Software-Sciences/Module-3-Databases-New/10-Complex-Joins-and-Subqueries/09-Complex-Joins-and-Subqueries.pptx
+++ b/Courses/Software-Sciences/Module-3-Databases-New/10-Complex-Joins-and-Subqueries/09-Complex-Joins-and-Subqueries.pptx
@@ -447,7 +447,7 @@
           <a:p>
             <a:fld id="{4E087215-0C8F-4762-A664-737A353EC9A4}" type="datetimeFigureOut">
               <a:rPr lang="bg-BG" smtClean="0"/>
-              <a:t>6.10.2023 г.</a:t>
+              <a:t>6.12.2023 г.</a:t>
             </a:fld>
             <a:endParaRPr lang="bg-BG"/>
           </a:p>
@@ -643,7 +643,7 @@
           <a:p>
             <a:fld id="{72D84649-876A-46C9-8472-14CB09C070D8}" type="datetimeFigureOut">
               <a:rPr lang="en-US" smtClean="0"/>
-              <a:t>10/6/2023</a:t>
+              <a:t>12/6/2023</a:t>
             </a:fld>
             <a:endParaRPr lang="en-US"/>
           </a:p>
@@ -19211,17 +19211,17 @@
           <a:lstStyle/>
           <a:p>
             <a:r>
-              <a:rPr lang="bg-BG" sz="3200" dirty="0"/>
+              <a:rPr lang="bg-BG" dirty="0"/>
               <a:t>По-сложни съединения</a:t>
             </a:r>
           </a:p>
           <a:p>
             <a:r>
-              <a:rPr lang="en-US" sz="3200" dirty="0"/>
+              <a:rPr lang="en-US" dirty="0"/>
               <a:t>͏</a:t>
             </a:r>
             <a:r>
-              <a:rPr lang="bg-BG" sz="3200" b="1" dirty="0">
+              <a:rPr lang="bg-BG" b="1" dirty="0">
                 <a:solidFill>
                   <a:schemeClr val="bg1"/>
                 </a:solidFill>
@@ -19229,17 +19229,17 @@
               <a:t>Вложени</a:t>
             </a:r>
             <a:r>
-              <a:rPr lang="bg-BG" sz="3200" dirty="0"/>
+              <a:rPr lang="bg-BG" dirty="0"/>
               <a:t> заявки</a:t>
             </a:r>
           </a:p>
           <a:p>
             <a:r>
-              <a:rPr lang="bg-BG" sz="3200" dirty="0"/>
+              <a:rPr lang="bg-BG" dirty="0"/>
               <a:t>Операции за </a:t>
             </a:r>
             <a:r>
-              <a:rPr lang="bg-BG" sz="3200" b="1" dirty="0">
+              <a:rPr lang="bg-BG" b="1" dirty="0">
                 <a:solidFill>
                   <a:schemeClr val="bg1"/>
                 </a:solidFill>
@@ -19247,11 +19247,11 @@
               <a:t>обединение</a:t>
             </a:r>
             <a:r>
-              <a:rPr lang="bg-BG" sz="3200" dirty="0"/>
+              <a:rPr lang="bg-BG" dirty="0"/>
               <a:t>, </a:t>
             </a:r>
             <a:r>
-              <a:rPr lang="bg-BG" sz="3200" b="1" dirty="0">
+              <a:rPr lang="bg-BG" b="1" dirty="0">
                 <a:solidFill>
                   <a:schemeClr val="bg1"/>
                 </a:solidFill>
@@ -19259,11 +19259,11 @@
               <a:t>сечение</a:t>
             </a:r>
             <a:r>
-              <a:rPr lang="bg-BG" sz="3200" dirty="0"/>
+              <a:rPr lang="bg-BG" dirty="0"/>
               <a:t>, </a:t>
             </a:r>
             <a:r>
-              <a:rPr lang="bg-BG" sz="3200" b="1" dirty="0">
+              <a:rPr lang="bg-BG" b="1" dirty="0">
                 <a:solidFill>
                   <a:schemeClr val="bg1"/>
                 </a:solidFill>
@@ -19271,11 +19271,11 @@
               <a:t>разлика</a:t>
             </a:r>
             <a:r>
-              <a:rPr lang="bg-BG" sz="3200" dirty="0"/>
+              <a:rPr lang="bg-BG" dirty="0"/>
               <a:t> и </a:t>
             </a:r>
             <a:r>
-              <a:rPr lang="bg-BG" sz="3200" b="1" dirty="0">
+              <a:rPr lang="bg-BG" b="1" dirty="0">
                 <a:solidFill>
                   <a:schemeClr val="bg1"/>
                 </a:solidFill>
@@ -26224,7 +26224,7 @@
         <p:spPr>
           <a:xfrm>
             <a:off x="190402" y="1196124"/>
-            <a:ext cx="11818096" cy="5661875"/>
+            <a:ext cx="6490598" cy="5661875"/>
           </a:xfrm>
         </p:spPr>
         <p:txBody>
@@ -26325,7 +26325,7 @@
             </a:r>
             <a:r>
               <a:rPr lang="bg-BG" dirty="0"/>
-              <a:t>свързващата таблица </a:t>
+              <a:t>и таблица </a:t>
             </a:r>
             <a:r>
               <a:rPr lang="en-US" b="1" dirty="0">
@@ -26404,6 +26404,43 @@
           </a:p>
         </p:txBody>
       </p:sp>
+      <p:pic>
+        <p:nvPicPr>
+          <p:cNvPr id="6" name="Picture 5">
+            <a:extLst>
+              <a:ext uri="{FF2B5EF4-FFF2-40B4-BE49-F238E27FC236}">
+                <a16:creationId xmlns:a16="http://schemas.microsoft.com/office/drawing/2014/main" id="{A4AB4F17-CE27-9E4D-8D3B-0FAEB24AA744}"/>
+              </a:ext>
+            </a:extLst>
+          </p:cNvPr>
+          <p:cNvPicPr>
+            <a:picLocks noChangeAspect="1"/>
+          </p:cNvPicPr>
+          <p:nvPr/>
+        </p:nvPicPr>
+        <p:blipFill>
+          <a:blip r:embed="rId2"/>
+          <a:stretch>
+            <a:fillRect/>
+          </a:stretch>
+        </p:blipFill>
+        <p:spPr>
+          <a:xfrm>
+            <a:off x="6539818" y="1196124"/>
+            <a:ext cx="5461780" cy="4185000"/>
+          </a:xfrm>
+          <a:prstGeom prst="rect">
+            <a:avLst/>
+          </a:prstGeom>
+          <a:ln>
+            <a:solidFill>
+              <a:schemeClr val="bg2">
+                <a:lumMod val="75000"/>
+              </a:schemeClr>
+            </a:solidFill>
+          </a:ln>
+        </p:spPr>
+      </p:pic>
     </p:spTree>
     <p:extLst>
       <p:ext uri="{BB962C8B-B14F-4D97-AF65-F5344CB8AC3E}">
@@ -26553,6 +26590,33 @@
                                   </p:childTnLst>
                                 </p:cTn>
                               </p:par>
+                              <p:par>
+                                <p:cTn id="13" presetID="1" presetClass="entr" presetSubtype="0" fill="hold" nodeType="withEffect">
+                                  <p:stCondLst>
+                                    <p:cond delay="0"/>
+                                  </p:stCondLst>
+                                  <p:childTnLst>
+                                    <p:set>
+                                      <p:cBhvr>
+                                        <p:cTn id="14" dur="1" fill="hold">
+                                          <p:stCondLst>
+                                            <p:cond delay="0"/>
+                                          </p:stCondLst>
+                                        </p:cTn>
+                                        <p:tgtEl>
+                                          <p:spTgt spid="6"/>
+                                        </p:tgtEl>
+                                        <p:attrNameLst>
+                                          <p:attrName>style.visibility</p:attrName>
+                                        </p:attrNameLst>
+                                      </p:cBhvr>
+                                      <p:to>
+                                        <p:strVal val="visible"/>
+                                      </p:to>
+                                    </p:set>
+                                  </p:childTnLst>
+                                </p:cTn>
+                              </p:par>
                             </p:childTnLst>
                           </p:cTn>
                         </p:par>
@@ -26620,11 +26684,11 @@
           <a:lstStyle/>
           <a:p>
             <a:r>
-              <a:rPr lang="ru-RU" dirty="0"/>
+              <a:rPr lang="ru-RU" sz="3600" dirty="0"/>
               <a:t>Искаме да извлечем следната информация за </a:t>
             </a:r>
             <a:r>
-              <a:rPr lang="ru-RU" b="1" dirty="0">
+              <a:rPr lang="ru-RU" sz="3600" b="1" dirty="0">
                 <a:solidFill>
                   <a:schemeClr val="bg1"/>
                 </a:solidFill>
@@ -26632,11 +26696,11 @@
               <a:t>всяка</a:t>
             </a:r>
             <a:r>
-              <a:rPr lang="ru-RU" dirty="0"/>
+              <a:rPr lang="ru-RU" sz="3600" dirty="0"/>
               <a:t> </a:t>
             </a:r>
             <a:r>
-              <a:rPr lang="ru-RU" b="1" dirty="0">
+              <a:rPr lang="ru-RU" sz="3600" b="1" dirty="0">
                 <a:solidFill>
                   <a:schemeClr val="bg1"/>
                 </a:solidFill>
@@ -26644,45 +26708,45 @@
               <a:t>поръчка</a:t>
             </a:r>
             <a:r>
-              <a:rPr lang="ru-RU" dirty="0"/>
+              <a:rPr lang="ru-RU" sz="3600" dirty="0"/>
               <a:t>:</a:t>
             </a:r>
-            <a:endParaRPr lang="en-US" dirty="0"/>
+            <a:endParaRPr lang="en-US" sz="3600" dirty="0"/>
           </a:p>
           <a:p>
             <a:pPr lvl="1"/>
             <a:r>
-              <a:rPr lang="bg-BG" dirty="0"/>
+              <a:rPr lang="bg-BG" sz="3400" dirty="0"/>
               <a:t>Име на клиента</a:t>
             </a:r>
-            <a:endParaRPr lang="en-US" dirty="0"/>
+            <a:endParaRPr lang="en-US" sz="3400" dirty="0"/>
           </a:p>
           <a:p>
             <a:pPr lvl="1"/>
             <a:r>
-              <a:rPr lang="bg-BG" dirty="0"/>
+              <a:rPr lang="bg-BG" sz="3400" dirty="0"/>
               <a:t>Дата на поръчката</a:t>
             </a:r>
           </a:p>
           <a:p>
             <a:pPr lvl="1"/>
             <a:r>
-              <a:rPr lang="bg-BG" dirty="0"/>
+              <a:rPr lang="bg-BG" sz="3400" dirty="0"/>
               <a:t>Списък на </a:t>
             </a:r>
             <a:r>
-              <a:rPr lang="ru-RU" dirty="0"/>
+              <a:rPr lang="ru-RU" sz="3400" dirty="0"/>
               <a:t>поръчаните </a:t>
             </a:r>
             <a:r>
-              <a:rPr lang="bg-BG" dirty="0"/>
+              <a:rPr lang="bg-BG" sz="3400" dirty="0"/>
               <a:t>продукти</a:t>
             </a:r>
           </a:p>
           <a:p>
             <a:pPr lvl="1"/>
             <a:r>
-              <a:rPr lang="ru-RU" dirty="0"/>
+              <a:rPr lang="ru-RU" sz="3400" dirty="0"/>
               <a:t>Количеството на поръчаните продукти</a:t>
             </a:r>
           </a:p>

</xml_diff>

<commit_message>
Changes and fixes on slides for Subqueries
</commit_message>
<xml_diff>
--- a/Courses/Software-Sciences/Module-3-Databases-New/10-Complex-Joins-and-Subqueries/09-Complex-Joins-and-Subqueries.pptx
+++ b/Courses/Software-Sciences/Module-3-Databases-New/10-Complex-Joins-and-Subqueries/09-Complex-Joins-and-Subqueries.pptx
@@ -447,7 +447,7 @@
           <a:p>
             <a:fld id="{4E087215-0C8F-4762-A664-737A353EC9A4}" type="datetimeFigureOut">
               <a:rPr lang="bg-BG" smtClean="0"/>
-              <a:t>6.12.2023 г.</a:t>
+              <a:t>18.12.2023 г.</a:t>
             </a:fld>
             <a:endParaRPr lang="bg-BG"/>
           </a:p>
@@ -643,7 +643,7 @@
           <a:p>
             <a:fld id="{72D84649-876A-46C9-8472-14CB09C070D8}" type="datetimeFigureOut">
               <a:rPr lang="en-US" smtClean="0"/>
-              <a:t>12/6/2023</a:t>
+              <a:t>12/18/2023</a:t>
             </a:fld>
             <a:endParaRPr lang="en-US"/>
           </a:p>
@@ -26714,40 +26714,120 @@
             <a:endParaRPr lang="en-US" sz="3600" dirty="0"/>
           </a:p>
           <a:p>
-            <a:pPr lvl="1"/>
+            <a:pPr lvl="1">
+              <a:buClr>
+                <a:schemeClr val="tx1"/>
+              </a:buClr>
+            </a:pPr>
+            <a:r>
+              <a:rPr lang="bg-BG" sz="3400" b="1" dirty="0">
+                <a:solidFill>
+                  <a:schemeClr val="bg1"/>
+                </a:solidFill>
+              </a:rPr>
+              <a:t>Име</a:t>
+            </a:r>
             <a:r>
               <a:rPr lang="bg-BG" sz="3400" dirty="0"/>
-              <a:t>Име на клиента</a:t>
-            </a:r>
-            <a:endParaRPr lang="en-US" sz="3400" dirty="0"/>
-          </a:p>
-          <a:p>
-            <a:pPr lvl="1"/>
+              <a:t> на </a:t>
+            </a:r>
+            <a:r>
+              <a:rPr lang="bg-BG" sz="3400" b="1" dirty="0">
+                <a:solidFill>
+                  <a:schemeClr val="bg1"/>
+                </a:solidFill>
+              </a:rPr>
+              <a:t>клиента</a:t>
+            </a:r>
+            <a:endParaRPr lang="en-US" sz="3400" b="1" dirty="0">
+              <a:solidFill>
+                <a:schemeClr val="bg1"/>
+              </a:solidFill>
+            </a:endParaRPr>
+          </a:p>
+          <a:p>
+            <a:pPr lvl="1">
+              <a:buClr>
+                <a:schemeClr val="tx1"/>
+              </a:buClr>
+            </a:pPr>
+            <a:r>
+              <a:rPr lang="bg-BG" sz="3400" b="1" dirty="0">
+                <a:solidFill>
+                  <a:schemeClr val="bg1"/>
+                </a:solidFill>
+              </a:rPr>
+              <a:t>Дата</a:t>
+            </a:r>
             <a:r>
               <a:rPr lang="bg-BG" sz="3400" dirty="0"/>
-              <a:t>Дата на поръчката</a:t>
-            </a:r>
-          </a:p>
-          <a:p>
-            <a:pPr lvl="1"/>
+              <a:t> на </a:t>
+            </a:r>
+            <a:r>
+              <a:rPr lang="bg-BG" sz="3400" b="1" dirty="0">
+                <a:solidFill>
+                  <a:schemeClr val="bg1"/>
+                </a:solidFill>
+              </a:rPr>
+              <a:t>поръчката</a:t>
+            </a:r>
+          </a:p>
+          <a:p>
+            <a:pPr lvl="1">
+              <a:buClr>
+                <a:schemeClr val="tx1"/>
+              </a:buClr>
+            </a:pPr>
+            <a:r>
+              <a:rPr lang="bg-BG" sz="3400" b="1" dirty="0">
+                <a:solidFill>
+                  <a:schemeClr val="bg1"/>
+                </a:solidFill>
+              </a:rPr>
+              <a:t>Списък</a:t>
+            </a:r>
             <a:r>
               <a:rPr lang="bg-BG" sz="3400" dirty="0"/>
-              <a:t>Списък на </a:t>
+              <a:t> на </a:t>
             </a:r>
             <a:r>
               <a:rPr lang="ru-RU" sz="3400" dirty="0"/>
               <a:t>поръчаните </a:t>
             </a:r>
             <a:r>
-              <a:rPr lang="bg-BG" sz="3400" dirty="0"/>
+              <a:rPr lang="bg-BG" sz="3400" b="1" dirty="0">
+                <a:solidFill>
+                  <a:schemeClr val="bg1"/>
+                </a:solidFill>
+              </a:rPr>
               <a:t>продукти</a:t>
             </a:r>
           </a:p>
           <a:p>
-            <a:pPr lvl="1"/>
+            <a:pPr lvl="1">
+              <a:buClr>
+                <a:schemeClr val="tx1"/>
+              </a:buClr>
+            </a:pPr>
+            <a:r>
+              <a:rPr lang="ru-RU" sz="3400" b="1" dirty="0">
+                <a:solidFill>
+                  <a:schemeClr val="bg1"/>
+                </a:solidFill>
+              </a:rPr>
+              <a:t>Количеството</a:t>
+            </a:r>
             <a:r>
               <a:rPr lang="ru-RU" sz="3400" dirty="0"/>
-              <a:t>Количеството на поръчаните продукти</a:t>
+              <a:t> на поръчаните </a:t>
+            </a:r>
+            <a:r>
+              <a:rPr lang="ru-RU" sz="3400" b="1" dirty="0">
+                <a:solidFill>
+                  <a:schemeClr val="bg1"/>
+                </a:solidFill>
+              </a:rPr>
+              <a:t>продукти</a:t>
             </a:r>
           </a:p>
           <a:p>
@@ -27332,7 +27412,7 @@
         </p:nvSpPr>
         <p:spPr bwMode="auto">
           <a:xfrm>
-            <a:off x="7696200" y="2743200"/>
+            <a:off x="7779600" y="2743200"/>
             <a:ext cx="3581400" cy="838200"/>
           </a:xfrm>
           <a:prstGeom prst="wedgeRoundRectCallout">
@@ -27478,13 +27558,13 @@
         </p:nvSpPr>
         <p:spPr bwMode="auto">
           <a:xfrm>
-            <a:off x="3124200" y="4343401"/>
+            <a:off x="2496000" y="4329000"/>
             <a:ext cx="3505200" cy="609600"/>
           </a:xfrm>
           <a:prstGeom prst="wedgeRoundRectCallout">
             <a:avLst>
-              <a:gd name="adj1" fmla="val 5599"/>
-              <a:gd name="adj2" fmla="val -113370"/>
+              <a:gd name="adj1" fmla="val -27978"/>
+              <a:gd name="adj2" fmla="val -122281"/>
               <a:gd name="adj3" fmla="val 16667"/>
             </a:avLst>
           </a:prstGeom>
@@ -29528,129 +29608,6 @@
           <a:chExt cx="0" cy="0"/>
         </a:xfrm>
       </p:grpSpPr>
-      <p:grpSp>
-        <p:nvGrpSpPr>
-          <p:cNvPr id="2" name="Group 19"/>
-          <p:cNvGrpSpPr/>
-          <p:nvPr/>
-        </p:nvGrpSpPr>
-        <p:grpSpPr>
-          <a:xfrm>
-            <a:off x="4498083" y="1379593"/>
-            <a:ext cx="3282918" cy="2392426"/>
-            <a:chOff x="4454541" y="1263350"/>
-            <a:chExt cx="3282918" cy="2392426"/>
-          </a:xfrm>
-        </p:grpSpPr>
-        <p:pic>
-          <p:nvPicPr>
-            <p:cNvPr id="14" name="Picture 13"/>
-            <p:cNvPicPr>
-              <a:picLocks noChangeAspect="1"/>
-            </p:cNvPicPr>
-            <p:nvPr/>
-          </p:nvPicPr>
-          <p:blipFill>
-            <a:blip r:embed="rId3" cstate="print">
-              <a:extLst>
-                <a:ext uri="{28A0092B-C50C-407E-A947-70E740481C1C}">
-                  <a14:useLocalDpi xmlns:a14="http://schemas.microsoft.com/office/drawing/2010/main" val="0"/>
-                </a:ext>
-              </a:extLst>
-            </a:blip>
-            <a:stretch>
-              <a:fillRect/>
-            </a:stretch>
-          </p:blipFill>
-          <p:spPr>
-            <a:xfrm>
-              <a:off x="4454541" y="1263350"/>
-              <a:ext cx="3282918" cy="2392426"/>
-            </a:xfrm>
-            <a:prstGeom prst="rect">
-              <a:avLst/>
-            </a:prstGeom>
-          </p:spPr>
-        </p:pic>
-        <p:pic>
-          <p:nvPicPr>
-            <p:cNvPr id="22" name="Picture 21"/>
-            <p:cNvPicPr>
-              <a:picLocks noChangeAspect="1"/>
-            </p:cNvPicPr>
-            <p:nvPr/>
-          </p:nvPicPr>
-          <p:blipFill>
-            <a:blip r:embed="rId4" cstate="print">
-              <a:extLst>
-                <a:ext uri="{BEBA8EAE-BF5A-486C-A8C5-ECC9F3942E4B}">
-                  <a14:imgProps xmlns:a14="http://schemas.microsoft.com/office/drawing/2010/main">
-                    <a14:imgLayer r:embed="rId5">
-                      <a14:imgEffect>
-                        <a14:brightnessContrast bright="13000"/>
-                      </a14:imgEffect>
-                    </a14:imgLayer>
-                  </a14:imgProps>
-                </a:ext>
-                <a:ext uri="{28A0092B-C50C-407E-A947-70E740481C1C}">
-                  <a14:useLocalDpi xmlns:a14="http://schemas.microsoft.com/office/drawing/2010/main" val="0"/>
-                </a:ext>
-              </a:extLst>
-            </a:blip>
-            <a:stretch>
-              <a:fillRect/>
-            </a:stretch>
-          </p:blipFill>
-          <p:spPr>
-            <a:xfrm>
-              <a:off x="5119057" y="1720288"/>
-              <a:ext cx="1953886" cy="1423894"/>
-            </a:xfrm>
-            <a:prstGeom prst="rect">
-              <a:avLst/>
-            </a:prstGeom>
-          </p:spPr>
-        </p:pic>
-        <p:pic>
-          <p:nvPicPr>
-            <p:cNvPr id="23" name="Picture 22"/>
-            <p:cNvPicPr>
-              <a:picLocks noChangeAspect="1"/>
-            </p:cNvPicPr>
-            <p:nvPr/>
-          </p:nvPicPr>
-          <p:blipFill>
-            <a:blip r:embed="rId6" cstate="print">
-              <a:extLst>
-                <a:ext uri="{BEBA8EAE-BF5A-486C-A8C5-ECC9F3942E4B}">
-                  <a14:imgProps xmlns:a14="http://schemas.microsoft.com/office/drawing/2010/main">
-                    <a14:imgLayer r:embed="rId7">
-                      <a14:imgEffect>
-                        <a14:brightnessContrast bright="37000"/>
-                      </a14:imgEffect>
-                    </a14:imgLayer>
-                  </a14:imgProps>
-                </a:ext>
-                <a:ext uri="{28A0092B-C50C-407E-A947-70E740481C1C}">
-                  <a14:useLocalDpi xmlns:a14="http://schemas.microsoft.com/office/drawing/2010/main" val="0"/>
-                </a:ext>
-              </a:extLst>
-            </a:blip>
-            <a:stretch>
-              <a:fillRect/>
-            </a:stretch>
-          </p:blipFill>
-          <p:spPr>
-            <a:xfrm>
-              <a:off x="5497665" y="2062592"/>
-              <a:ext cx="1107748" cy="807271"/>
-            </a:xfrm>
-            <a:prstGeom prst="rect">
-              <a:avLst/>
-            </a:prstGeom>
-          </p:spPr>
-        </p:pic>
-      </p:grpSp>
       <p:sp>
         <p:nvSpPr>
           <p:cNvPr id="5" name="Заглавие 4">
@@ -29708,6 +29665,41 @@
           </a:p>
         </p:txBody>
       </p:sp>
+      <p:pic>
+        <p:nvPicPr>
+          <p:cNvPr id="6" name="Picture 5" descr="A logo of a stack of coins&#10;&#10;Description automatically generated">
+            <a:extLst>
+              <a:ext uri="{FF2B5EF4-FFF2-40B4-BE49-F238E27FC236}">
+                <a16:creationId xmlns:a16="http://schemas.microsoft.com/office/drawing/2014/main" id="{CA71CE7A-A211-637D-7B7D-4705903BC349}"/>
+              </a:ext>
+            </a:extLst>
+          </p:cNvPr>
+          <p:cNvPicPr>
+            <a:picLocks noChangeAspect="1"/>
+          </p:cNvPicPr>
+          <p:nvPr/>
+        </p:nvPicPr>
+        <p:blipFill rotWithShape="1">
+          <a:blip r:embed="rId3">
+            <a:extLst>
+              <a:ext uri="{28A0092B-C50C-407E-A947-70E740481C1C}">
+                <a14:useLocalDpi xmlns:a14="http://schemas.microsoft.com/office/drawing/2010/main" val="0"/>
+              </a:ext>
+            </a:extLst>
+          </a:blip>
+          <a:srcRect l="13157" t="13934" r="13160" b="13698"/>
+          <a:stretch/>
+        </p:blipFill>
+        <p:spPr>
+          <a:xfrm>
+            <a:off x="4721454" y="1314000"/>
+            <a:ext cx="2749091" cy="2700000"/>
+          </a:xfrm>
+          <a:prstGeom prst="ellipse">
+            <a:avLst/>
+          </a:prstGeom>
+        </p:spPr>
+      </p:pic>
     </p:spTree>
     <p:extLst>
       <p:ext uri="{BB962C8B-B14F-4D97-AF65-F5344CB8AC3E}">

</xml_diff>